<commit_message>
update image dev files
</commit_message>
<xml_diff>
--- a/docs/img/buttons.pptx
+++ b/docs/img/buttons.pptx
@@ -3445,6 +3445,42 @@
           </a:prstGeom>
         </p:spPr>
       </p:pic>
+      <p:pic>
+        <p:nvPicPr>
+          <p:cNvPr id="16" name="Graphic 15">
+            <a:extLst>
+              <a:ext uri="{FF2B5EF4-FFF2-40B4-BE49-F238E27FC236}">
+                <a16:creationId xmlns:a16="http://schemas.microsoft.com/office/drawing/2014/main" id="{10C2C17F-BA96-8044-8280-E7DA0F330438}"/>
+              </a:ext>
+            </a:extLst>
+          </p:cNvPr>
+          <p:cNvPicPr>
+            <a:picLocks noChangeAspect="1"/>
+          </p:cNvPicPr>
+          <p:nvPr/>
+        </p:nvPicPr>
+        <p:blipFill>
+          <a:blip r:embed="rId7">
+            <a:extLst>
+              <a:ext uri="{96DAC541-7B7A-43D3-8B79-37D633B846F1}">
+                <asvg:svgBlip xmlns:asvg="http://schemas.microsoft.com/office/drawing/2016/SVG/main" r:embed="rId8"/>
+              </a:ext>
+            </a:extLst>
+          </a:blip>
+          <a:stretch>
+            <a:fillRect/>
+          </a:stretch>
+        </p:blipFill>
+        <p:spPr>
+          <a:xfrm>
+            <a:off x="4791074" y="3018773"/>
+            <a:ext cx="2609851" cy="3236215"/>
+          </a:xfrm>
+          <a:prstGeom prst="rect">
+            <a:avLst/>
+          </a:prstGeom>
+        </p:spPr>
+      </p:pic>
     </p:spTree>
     <p:extLst>
       <p:ext uri="{BB962C8B-B14F-4D97-AF65-F5344CB8AC3E}">

</xml_diff>